<commit_message>
Added a few more links to lesson resources
</commit_message>
<xml_diff>
--- a/Notes/Lesson 1.pptx
+++ b/Notes/Lesson 1.pptx
@@ -6810,6 +6810,84 @@
         </a:p>
       </dgm:t>
     </dgm:pt>
+    <dgm:pt modelId="{DCDDC6DA-9E0C-4B21-B0C8-53C27BBD124A}">
+      <dgm:prSet/>
+      <dgm:spPr/>
+      <dgm:t>
+        <a:bodyPr/>
+        <a:lstStyle/>
+        <a:p>
+          <a:r>
+            <a:rPr lang="en-US" dirty="0"/>
+            <a:t>Annotated notebook</a:t>
+          </a:r>
+        </a:p>
+      </dgm:t>
+    </dgm:pt>
+    <dgm:pt modelId="{4717EA91-A827-47D3-877D-A968D6B183F5}" type="parTrans" cxnId="{E11FE5D9-140A-427B-8567-6AB669A7746A}">
+      <dgm:prSet/>
+      <dgm:spPr/>
+      <dgm:t>
+        <a:bodyPr/>
+        <a:lstStyle/>
+        <a:p>
+          <a:endParaRPr lang="en-US"/>
+        </a:p>
+      </dgm:t>
+    </dgm:pt>
+    <dgm:pt modelId="{468935E6-2082-42EF-9782-B553DF1C6DDF}" type="sibTrans" cxnId="{E11FE5D9-140A-427B-8567-6AB669A7746A}">
+      <dgm:prSet/>
+      <dgm:spPr/>
+      <dgm:t>
+        <a:bodyPr/>
+        <a:lstStyle/>
+        <a:p>
+          <a:endParaRPr lang="en-US"/>
+        </a:p>
+      </dgm:t>
+    </dgm:pt>
+    <dgm:pt modelId="{72CBB657-1967-43FB-97EC-547EFEA47D53}">
+      <dgm:prSet/>
+      <dgm:spPr/>
+      <dgm:t>
+        <a:bodyPr/>
+        <a:lstStyle/>
+        <a:p>
+          <a:r>
+            <a:rPr lang="en-US">
+              <a:hlinkClick xmlns:r="http://schemas.openxmlformats.org/officeDocument/2006/relationships" r:id="rId4"/>
+            </a:rPr>
+            <a:t>http://forums.fast.ai/uploads/default/original/2X/b/b01dffa62debfb8450fb9a3969d650645c54a3aa.pdf</a:t>
+          </a:r>
+          <a:endParaRPr lang="en-US"/>
+        </a:p>
+        <a:p>
+          <a:endParaRPr lang="en-US" dirty="0"/>
+        </a:p>
+      </dgm:t>
+    </dgm:pt>
+    <dgm:pt modelId="{45BA7138-EA5E-4D46-A12C-5AB80241D05F}" type="parTrans" cxnId="{374E0523-4B96-403A-8604-D0C140FD245C}">
+      <dgm:prSet/>
+      <dgm:spPr/>
+      <dgm:t>
+        <a:bodyPr/>
+        <a:lstStyle/>
+        <a:p>
+          <a:endParaRPr lang="en-US"/>
+        </a:p>
+      </dgm:t>
+    </dgm:pt>
+    <dgm:pt modelId="{96FFED84-AE4D-4EC2-BA3E-7BE2541FA01B}" type="sibTrans" cxnId="{374E0523-4B96-403A-8604-D0C140FD245C}">
+      <dgm:prSet/>
+      <dgm:spPr/>
+      <dgm:t>
+        <a:bodyPr/>
+        <a:lstStyle/>
+        <a:p>
+          <a:endParaRPr lang="en-US"/>
+        </a:p>
+      </dgm:t>
+    </dgm:pt>
     <dgm:pt modelId="{E3BBF9F9-EA24-446F-B60F-0A4FB708FBF5}" type="pres">
       <dgm:prSet presAssocID="{E5EDB5D7-BC1B-48BD-A70F-F34A8857AF1B}" presName="Name0" presStyleCnt="0">
         <dgm:presLayoutVars>
@@ -6825,7 +6903,7 @@
       <dgm:spPr/>
     </dgm:pt>
     <dgm:pt modelId="{D6BD43AF-85A7-4906-A0C3-74C2486CD0A8}" type="pres">
-      <dgm:prSet presAssocID="{2E5E6504-97A1-4E28-812F-ABDF54332BEB}" presName="parTx" presStyleLbl="alignNode1" presStyleIdx="0" presStyleCnt="3">
+      <dgm:prSet presAssocID="{2E5E6504-97A1-4E28-812F-ABDF54332BEB}" presName="parTx" presStyleLbl="alignNode1" presStyleIdx="0" presStyleCnt="4">
         <dgm:presLayoutVars>
           <dgm:chMax val="0"/>
           <dgm:chPref val="0"/>
@@ -6834,7 +6912,7 @@
       <dgm:spPr/>
     </dgm:pt>
     <dgm:pt modelId="{82167CD7-E6E8-4613-BAEB-8C279FDEB845}" type="pres">
-      <dgm:prSet presAssocID="{2E5E6504-97A1-4E28-812F-ABDF54332BEB}" presName="desTx" presStyleLbl="alignAccFollowNode1" presStyleIdx="0" presStyleCnt="3">
+      <dgm:prSet presAssocID="{2E5E6504-97A1-4E28-812F-ABDF54332BEB}" presName="desTx" presStyleLbl="alignAccFollowNode1" presStyleIdx="0" presStyleCnt="4">
         <dgm:presLayoutVars/>
       </dgm:prSet>
       <dgm:spPr/>
@@ -6848,7 +6926,7 @@
       <dgm:spPr/>
     </dgm:pt>
     <dgm:pt modelId="{8AFF3B11-F2BB-4A5F-8A26-86AA83588E2B}" type="pres">
-      <dgm:prSet presAssocID="{A2178847-ED2C-4ECF-BFA1-2795D32671AA}" presName="parTx" presStyleLbl="alignNode1" presStyleIdx="1" presStyleCnt="3">
+      <dgm:prSet presAssocID="{A2178847-ED2C-4ECF-BFA1-2795D32671AA}" presName="parTx" presStyleLbl="alignNode1" presStyleIdx="1" presStyleCnt="4">
         <dgm:presLayoutVars>
           <dgm:chMax val="0"/>
           <dgm:chPref val="0"/>
@@ -6857,7 +6935,7 @@
       <dgm:spPr/>
     </dgm:pt>
     <dgm:pt modelId="{D29488A2-EF62-4B1E-906E-2976E06BBC07}" type="pres">
-      <dgm:prSet presAssocID="{A2178847-ED2C-4ECF-BFA1-2795D32671AA}" presName="desTx" presStyleLbl="alignAccFollowNode1" presStyleIdx="1" presStyleCnt="3">
+      <dgm:prSet presAssocID="{A2178847-ED2C-4ECF-BFA1-2795D32671AA}" presName="desTx" presStyleLbl="alignAccFollowNode1" presStyleIdx="1" presStyleCnt="4">
         <dgm:presLayoutVars/>
       </dgm:prSet>
       <dgm:spPr/>
@@ -6871,7 +6949,7 @@
       <dgm:spPr/>
     </dgm:pt>
     <dgm:pt modelId="{7956D332-D801-4DD7-85FA-8624B0CCDFDE}" type="pres">
-      <dgm:prSet presAssocID="{1CED39A6-553B-4B5C-876D-51589E130BE0}" presName="parTx" presStyleLbl="alignNode1" presStyleIdx="2" presStyleCnt="3">
+      <dgm:prSet presAssocID="{1CED39A6-553B-4B5C-876D-51589E130BE0}" presName="parTx" presStyleLbl="alignNode1" presStyleIdx="2" presStyleCnt="4">
         <dgm:presLayoutVars>
           <dgm:chMax val="0"/>
           <dgm:chPref val="0"/>
@@ -6880,7 +6958,30 @@
       <dgm:spPr/>
     </dgm:pt>
     <dgm:pt modelId="{6D0FA155-DBBE-4FA7-8D07-9B245A6E2610}" type="pres">
-      <dgm:prSet presAssocID="{1CED39A6-553B-4B5C-876D-51589E130BE0}" presName="desTx" presStyleLbl="alignAccFollowNode1" presStyleIdx="2" presStyleCnt="3">
+      <dgm:prSet presAssocID="{1CED39A6-553B-4B5C-876D-51589E130BE0}" presName="desTx" presStyleLbl="alignAccFollowNode1" presStyleIdx="2" presStyleCnt="4">
+        <dgm:presLayoutVars/>
+      </dgm:prSet>
+      <dgm:spPr/>
+    </dgm:pt>
+    <dgm:pt modelId="{745C428D-D20E-4BB4-B140-7A79DCB4272D}" type="pres">
+      <dgm:prSet presAssocID="{DF7B5901-DFC7-4151-808A-2D45DF94CCEC}" presName="space" presStyleCnt="0"/>
+      <dgm:spPr/>
+    </dgm:pt>
+    <dgm:pt modelId="{480BE34A-E5E6-4D62-95F2-8F5804F36EB4}" type="pres">
+      <dgm:prSet presAssocID="{DCDDC6DA-9E0C-4B21-B0C8-53C27BBD124A}" presName="composite" presStyleCnt="0"/>
+      <dgm:spPr/>
+    </dgm:pt>
+    <dgm:pt modelId="{9A5C8D67-814B-44B2-972E-7481F8871FA4}" type="pres">
+      <dgm:prSet presAssocID="{DCDDC6DA-9E0C-4B21-B0C8-53C27BBD124A}" presName="parTx" presStyleLbl="alignNode1" presStyleIdx="3" presStyleCnt="4">
+        <dgm:presLayoutVars>
+          <dgm:chMax val="0"/>
+          <dgm:chPref val="0"/>
+        </dgm:presLayoutVars>
+      </dgm:prSet>
+      <dgm:spPr/>
+    </dgm:pt>
+    <dgm:pt modelId="{300D7F7E-4831-45C7-884C-88E76A998EA5}" type="pres">
+      <dgm:prSet presAssocID="{DCDDC6DA-9E0C-4B21-B0C8-53C27BBD124A}" presName="desTx" presStyleLbl="alignAccFollowNode1" presStyleIdx="3" presStyleCnt="4">
         <dgm:presLayoutVars/>
       </dgm:prSet>
       <dgm:spPr/>
@@ -6888,8 +6989,11 @@
   </dgm:ptLst>
   <dgm:cxnLst>
     <dgm:cxn modelId="{BE8CBC02-FAD8-4C07-BEB6-8D3EC6941AA5}" type="presOf" srcId="{6EF3FB6F-A69F-481C-8E49-016400474B27}" destId="{D29488A2-EF62-4B1E-906E-2976E06BBC07}" srcOrd="0" destOrd="0" presId="urn:microsoft.com/office/officeart/2016/7/layout/HorizontalActionList"/>
+    <dgm:cxn modelId="{C44B7508-87BB-4D6A-BD03-011CD97CBFB0}" type="presOf" srcId="{DCDDC6DA-9E0C-4B21-B0C8-53C27BBD124A}" destId="{9A5C8D67-814B-44B2-972E-7481F8871FA4}" srcOrd="0" destOrd="0" presId="urn:microsoft.com/office/officeart/2016/7/layout/HorizontalActionList"/>
     <dgm:cxn modelId="{146E2B0A-A34F-448E-B1ED-D03A14100CE6}" type="presOf" srcId="{BD8CD971-BC29-4FD5-A085-7D08054E7C4E}" destId="{82167CD7-E6E8-4613-BAEB-8C279FDEB845}" srcOrd="0" destOrd="0" presId="urn:microsoft.com/office/officeart/2016/7/layout/HorizontalActionList"/>
+    <dgm:cxn modelId="{374E0523-4B96-403A-8604-D0C140FD245C}" srcId="{DCDDC6DA-9E0C-4B21-B0C8-53C27BBD124A}" destId="{72CBB657-1967-43FB-97EC-547EFEA47D53}" srcOrd="0" destOrd="0" parTransId="{45BA7138-EA5E-4D46-A12C-5AB80241D05F}" sibTransId="{96FFED84-AE4D-4EC2-BA3E-7BE2541FA01B}"/>
     <dgm:cxn modelId="{2876132A-D5A1-4F3D-B4F1-45F1C57E9228}" type="presOf" srcId="{89749B35-859A-4BA1-B913-A5EBE3E859A4}" destId="{6D0FA155-DBBE-4FA7-8D07-9B245A6E2610}" srcOrd="0" destOrd="0" presId="urn:microsoft.com/office/officeart/2016/7/layout/HorizontalActionList"/>
+    <dgm:cxn modelId="{8F325163-53B4-4030-96F4-67D7FFAD84FB}" type="presOf" srcId="{72CBB657-1967-43FB-97EC-547EFEA47D53}" destId="{300D7F7E-4831-45C7-884C-88E76A998EA5}" srcOrd="0" destOrd="0" presId="urn:microsoft.com/office/officeart/2016/7/layout/HorizontalActionList"/>
     <dgm:cxn modelId="{364E046C-44C8-49F4-B89F-2D7FED5DF0E3}" srcId="{A2178847-ED2C-4ECF-BFA1-2795D32671AA}" destId="{6EF3FB6F-A69F-481C-8E49-016400474B27}" srcOrd="0" destOrd="0" parTransId="{308F80D7-8633-4CD0-85C3-99C4BB182AA3}" sibTransId="{069647C0-EB7E-450A-921A-A35B0B24CD1B}"/>
     <dgm:cxn modelId="{EC39854C-089B-423F-B0E8-999276043DA4}" srcId="{E5EDB5D7-BC1B-48BD-A70F-F34A8857AF1B}" destId="{2E5E6504-97A1-4E28-812F-ABDF54332BEB}" srcOrd="0" destOrd="0" parTransId="{12E74024-EDFC-44F4-8170-3A7A834C228D}" sibTransId="{9BFB5B50-B0D5-4FDF-B0CC-D2A843468BE0}"/>
     <dgm:cxn modelId="{74A13A75-06A2-49AA-AA16-F1EFAB4506AE}" srcId="{E5EDB5D7-BC1B-48BD-A70F-F34A8857AF1B}" destId="{A2178847-ED2C-4ECF-BFA1-2795D32671AA}" srcOrd="1" destOrd="0" parTransId="{96224C0D-DE5F-46EF-9432-BFC408B34063}" sibTransId="{7D99339D-27D1-42FB-B9D3-EF7821E462F8}"/>
@@ -6899,6 +7003,7 @@
     <dgm:cxn modelId="{A5A694C9-09AE-4F7B-BE0C-A1C15F260B4C}" srcId="{E5EDB5D7-BC1B-48BD-A70F-F34A8857AF1B}" destId="{1CED39A6-553B-4B5C-876D-51589E130BE0}" srcOrd="2" destOrd="0" parTransId="{E5208C46-24B5-439C-A5BF-080CD6847DE2}" sibTransId="{DF7B5901-DFC7-4151-808A-2D45DF94CCEC}"/>
     <dgm:cxn modelId="{BC5333CC-E8EA-4CA9-9027-F55281B0980C}" type="presOf" srcId="{E5EDB5D7-BC1B-48BD-A70F-F34A8857AF1B}" destId="{E3BBF9F9-EA24-446F-B60F-0A4FB708FBF5}" srcOrd="0" destOrd="0" presId="urn:microsoft.com/office/officeart/2016/7/layout/HorizontalActionList"/>
     <dgm:cxn modelId="{F9166ECE-D9B1-431E-AA49-2479CCD40287}" srcId="{1CED39A6-553B-4B5C-876D-51589E130BE0}" destId="{89749B35-859A-4BA1-B913-A5EBE3E859A4}" srcOrd="0" destOrd="0" parTransId="{22A8CEEB-4E4C-4150-B24A-F2CEE0D8CAF0}" sibTransId="{C006805A-A203-4ED3-83C0-54F28D318B60}"/>
+    <dgm:cxn modelId="{E11FE5D9-140A-427B-8567-6AB669A7746A}" srcId="{E5EDB5D7-BC1B-48BD-A70F-F34A8857AF1B}" destId="{DCDDC6DA-9E0C-4B21-B0C8-53C27BBD124A}" srcOrd="3" destOrd="0" parTransId="{4717EA91-A827-47D3-877D-A968D6B183F5}" sibTransId="{468935E6-2082-42EF-9782-B553DF1C6DDF}"/>
     <dgm:cxn modelId="{8EDCB3E1-7C60-4F5F-A095-912728B0AE85}" type="presOf" srcId="{2E5E6504-97A1-4E28-812F-ABDF54332BEB}" destId="{D6BD43AF-85A7-4906-A0C3-74C2486CD0A8}" srcOrd="0" destOrd="0" presId="urn:microsoft.com/office/officeart/2016/7/layout/HorizontalActionList"/>
     <dgm:cxn modelId="{4EC2DDD9-76E3-4E41-889F-5AF36108DF01}" type="presParOf" srcId="{E3BBF9F9-EA24-446F-B60F-0A4FB708FBF5}" destId="{A81B25BA-F466-4FFF-988E-5CC8F7487ED9}" srcOrd="0" destOrd="0" presId="urn:microsoft.com/office/officeart/2016/7/layout/HorizontalActionList"/>
     <dgm:cxn modelId="{3C0A648D-78F5-4BCC-9EFD-64843D4A1E95}" type="presParOf" srcId="{A81B25BA-F466-4FFF-988E-5CC8F7487ED9}" destId="{D6BD43AF-85A7-4906-A0C3-74C2486CD0A8}" srcOrd="0" destOrd="0" presId="urn:microsoft.com/office/officeart/2016/7/layout/HorizontalActionList"/>
@@ -6911,6 +7016,10 @@
     <dgm:cxn modelId="{8E356558-BD62-444A-8938-93653BA2DA0A}" type="presParOf" srcId="{E3BBF9F9-EA24-446F-B60F-0A4FB708FBF5}" destId="{F9FE0379-F8A7-475E-B3B1-DD0C461EF8D4}" srcOrd="4" destOrd="0" presId="urn:microsoft.com/office/officeart/2016/7/layout/HorizontalActionList"/>
     <dgm:cxn modelId="{ADBEE0FC-BA91-4EA7-A13B-AFA7FE555AB8}" type="presParOf" srcId="{F9FE0379-F8A7-475E-B3B1-DD0C461EF8D4}" destId="{7956D332-D801-4DD7-85FA-8624B0CCDFDE}" srcOrd="0" destOrd="0" presId="urn:microsoft.com/office/officeart/2016/7/layout/HorizontalActionList"/>
     <dgm:cxn modelId="{5089C50E-5635-427E-A0B9-AF06463959F6}" type="presParOf" srcId="{F9FE0379-F8A7-475E-B3B1-DD0C461EF8D4}" destId="{6D0FA155-DBBE-4FA7-8D07-9B245A6E2610}" srcOrd="1" destOrd="0" presId="urn:microsoft.com/office/officeart/2016/7/layout/HorizontalActionList"/>
+    <dgm:cxn modelId="{D9867A08-B089-44B7-9B61-0550C22A5F5C}" type="presParOf" srcId="{E3BBF9F9-EA24-446F-B60F-0A4FB708FBF5}" destId="{745C428D-D20E-4BB4-B140-7A79DCB4272D}" srcOrd="5" destOrd="0" presId="urn:microsoft.com/office/officeart/2016/7/layout/HorizontalActionList"/>
+    <dgm:cxn modelId="{BECBD071-E795-4127-A76D-56B431259A87}" type="presParOf" srcId="{E3BBF9F9-EA24-446F-B60F-0A4FB708FBF5}" destId="{480BE34A-E5E6-4D62-95F2-8F5804F36EB4}" srcOrd="6" destOrd="0" presId="urn:microsoft.com/office/officeart/2016/7/layout/HorizontalActionList"/>
+    <dgm:cxn modelId="{E4DCA73D-42D6-419F-A263-62F596F95CAF}" type="presParOf" srcId="{480BE34A-E5E6-4D62-95F2-8F5804F36EB4}" destId="{9A5C8D67-814B-44B2-972E-7481F8871FA4}" srcOrd="0" destOrd="0" presId="urn:microsoft.com/office/officeart/2016/7/layout/HorizontalActionList"/>
+    <dgm:cxn modelId="{EB6101F7-CA3A-4445-B351-C0A6A974D577}" type="presParOf" srcId="{480BE34A-E5E6-4D62-95F2-8F5804F36EB4}" destId="{300D7F7E-4831-45C7-884C-88E76A998EA5}" srcOrd="1" destOrd="0" presId="urn:microsoft.com/office/officeart/2016/7/layout/HorizontalActionList"/>
   </dgm:cxnLst>
   <dgm:bg/>
   <dgm:whole/>
@@ -9990,8 +10099,8 @@
       </dsp:nvSpPr>
       <dsp:spPr>
         <a:xfrm>
-          <a:off x="15214" y="816194"/>
-          <a:ext cx="3423197" cy="1026959"/>
+          <a:off x="12565" y="816194"/>
+          <a:ext cx="2541775" cy="762532"/>
         </a:xfrm>
         <a:prstGeom prst="rect">
           <a:avLst/>
@@ -10033,12 +10142,12 @@
         </a:fontRef>
       </dsp:style>
       <dsp:txBody>
-        <a:bodyPr spcFirstLastPara="0" vert="horz" wrap="square" lIns="270509" tIns="270509" rIns="270509" bIns="270509" numCol="1" spcCol="1270" anchor="ctr" anchorCtr="0">
+        <a:bodyPr spcFirstLastPara="0" vert="horz" wrap="square" lIns="200857" tIns="200857" rIns="200857" bIns="200857" numCol="1" spcCol="1270" anchor="ctr" anchorCtr="0">
           <a:noAutofit/>
         </a:bodyPr>
         <a:lstStyle/>
         <a:p>
-          <a:pPr marL="0" lvl="0" indent="0" algn="ctr" defTabSz="755650">
+          <a:pPr marL="0" lvl="0" indent="0" algn="ctr" defTabSz="622300">
             <a:lnSpc>
               <a:spcPct val="90000"/>
             </a:lnSpc>
@@ -10051,15 +10160,15 @@
             <a:buNone/>
           </a:pPr>
           <a:r>
-            <a:rPr lang="en-AU" sz="1700" kern="1200"/>
+            <a:rPr lang="en-AU" sz="1400" kern="1200"/>
             <a:t>Lesson 1 video (unedited)</a:t>
           </a:r>
-          <a:endParaRPr lang="en-US" sz="1700" kern="1200"/>
+          <a:endParaRPr lang="en-US" sz="1400" kern="1200"/>
         </a:p>
       </dsp:txBody>
       <dsp:txXfrm>
-        <a:off x="15214" y="816194"/>
-        <a:ext cx="3423197" cy="1026959"/>
+        <a:off x="12565" y="816194"/>
+        <a:ext cx="2541775" cy="762532"/>
       </dsp:txXfrm>
     </dsp:sp>
     <dsp:sp modelId="{82167CD7-E6E8-4613-BAEB-8C279FDEB845}">
@@ -10069,8 +10178,8 @@
       </dsp:nvSpPr>
       <dsp:spPr>
         <a:xfrm>
-          <a:off x="15214" y="1843153"/>
-          <a:ext cx="3423197" cy="1421625"/>
+          <a:off x="12565" y="1578727"/>
+          <a:ext cx="2541775" cy="1686051"/>
         </a:xfrm>
         <a:prstGeom prst="rect">
           <a:avLst/>
@@ -10114,7 +10223,7 @@
         <a:fontRef idx="minor"/>
       </dsp:style>
       <dsp:txBody>
-        <a:bodyPr spcFirstLastPara="0" vert="horz" wrap="square" lIns="338136" tIns="338136" rIns="338136" bIns="338136" numCol="1" spcCol="1270" anchor="t" anchorCtr="0">
+        <a:bodyPr spcFirstLastPara="0" vert="horz" wrap="square" lIns="251071" tIns="251071" rIns="251071" bIns="251071" numCol="1" spcCol="1270" anchor="t" anchorCtr="0">
           <a:noAutofit/>
         </a:bodyPr>
         <a:lstStyle/>
@@ -10141,8 +10250,8 @@
         </a:p>
       </dsp:txBody>
       <dsp:txXfrm>
-        <a:off x="15214" y="1843153"/>
-        <a:ext cx="3423197" cy="1421625"/>
+        <a:off x="12565" y="1578727"/>
+        <a:ext cx="2541775" cy="1686051"/>
       </dsp:txXfrm>
     </dsp:sp>
     <dsp:sp modelId="{8AFF3B11-F2BB-4A5F-8A26-86AA83588E2B}">
@@ -10152,26 +10261,26 @@
       </dsp:nvSpPr>
       <dsp:spPr>
         <a:xfrm>
-          <a:off x="3546201" y="816194"/>
-          <a:ext cx="3423197" cy="1026959"/>
+          <a:off x="2662130" y="816194"/>
+          <a:ext cx="2541775" cy="762532"/>
         </a:xfrm>
         <a:prstGeom prst="rect">
           <a:avLst/>
         </a:prstGeom>
         <a:solidFill>
           <a:schemeClr val="accent2">
-            <a:hueOff val="-727682"/>
-            <a:satOff val="-41964"/>
-            <a:lumOff val="4314"/>
+            <a:hueOff val="-485121"/>
+            <a:satOff val="-27976"/>
+            <a:lumOff val="2876"/>
             <a:alphaOff val="0"/>
           </a:schemeClr>
         </a:solidFill>
         <a:ln w="12700" cap="flat" cmpd="sng" algn="ctr">
           <a:solidFill>
             <a:schemeClr val="accent2">
-              <a:hueOff val="-727682"/>
-              <a:satOff val="-41964"/>
-              <a:lumOff val="4314"/>
+              <a:hueOff val="-485121"/>
+              <a:satOff val="-27976"/>
+              <a:lumOff val="2876"/>
               <a:alphaOff val="0"/>
             </a:schemeClr>
           </a:solidFill>
@@ -10195,12 +10304,12 @@
         </a:fontRef>
       </dsp:style>
       <dsp:txBody>
-        <a:bodyPr spcFirstLastPara="0" vert="horz" wrap="square" lIns="270509" tIns="270509" rIns="270509" bIns="270509" numCol="1" spcCol="1270" anchor="ctr" anchorCtr="0">
+        <a:bodyPr spcFirstLastPara="0" vert="horz" wrap="square" lIns="200857" tIns="200857" rIns="200857" bIns="200857" numCol="1" spcCol="1270" anchor="ctr" anchorCtr="0">
           <a:noAutofit/>
         </a:bodyPr>
         <a:lstStyle/>
         <a:p>
-          <a:pPr marL="0" lvl="0" indent="0" algn="ctr" defTabSz="755650">
+          <a:pPr marL="0" lvl="0" indent="0" algn="ctr" defTabSz="622300">
             <a:lnSpc>
               <a:spcPct val="90000"/>
             </a:lnSpc>
@@ -10213,15 +10322,15 @@
             <a:buNone/>
           </a:pPr>
           <a:r>
-            <a:rPr lang="en-AU" sz="1700" kern="1200"/>
+            <a:rPr lang="en-AU" sz="1400" kern="1200"/>
             <a:t>Lesson 1 notes (thanks Tim &amp; Sarada):</a:t>
           </a:r>
-          <a:endParaRPr lang="en-US" sz="1700" kern="1200"/>
+          <a:endParaRPr lang="en-US" sz="1400" kern="1200"/>
         </a:p>
       </dsp:txBody>
       <dsp:txXfrm>
-        <a:off x="3546201" y="816194"/>
-        <a:ext cx="3423197" cy="1026959"/>
+        <a:off x="2662130" y="816194"/>
+        <a:ext cx="2541775" cy="762532"/>
       </dsp:txXfrm>
     </dsp:sp>
     <dsp:sp modelId="{D29488A2-EF62-4B1E-906E-2976E06BBC07}">
@@ -10231,8 +10340,8 @@
       </dsp:nvSpPr>
       <dsp:spPr>
         <a:xfrm>
-          <a:off x="3546201" y="1843153"/>
-          <a:ext cx="3423197" cy="1421625"/>
+          <a:off x="2662130" y="1578727"/>
+          <a:ext cx="2541775" cy="1686051"/>
         </a:xfrm>
         <a:prstGeom prst="rect">
           <a:avLst/>
@@ -10241,9 +10350,9 @@
           <a:schemeClr val="accent2">
             <a:tint val="40000"/>
             <a:alpha val="90000"/>
-            <a:hueOff val="-424613"/>
-            <a:satOff val="-37673"/>
-            <a:lumOff val="-385"/>
+            <a:hueOff val="-283075"/>
+            <a:satOff val="-25115"/>
+            <a:lumOff val="-256"/>
             <a:alphaOff val="0"/>
           </a:schemeClr>
         </a:solidFill>
@@ -10252,9 +10361,9 @@
             <a:schemeClr val="accent2">
               <a:tint val="40000"/>
               <a:alpha val="90000"/>
-              <a:hueOff val="-424613"/>
-              <a:satOff val="-37673"/>
-              <a:lumOff val="-385"/>
+              <a:hueOff val="-283075"/>
+              <a:satOff val="-25115"/>
+              <a:lumOff val="-256"/>
               <a:alphaOff val="0"/>
             </a:schemeClr>
           </a:solidFill>
@@ -10276,7 +10385,7 @@
         <a:fontRef idx="minor"/>
       </dsp:style>
       <dsp:txBody>
-        <a:bodyPr spcFirstLastPara="0" vert="horz" wrap="square" lIns="338136" tIns="338136" rIns="338136" bIns="338136" numCol="1" spcCol="1270" anchor="t" anchorCtr="0">
+        <a:bodyPr spcFirstLastPara="0" vert="horz" wrap="square" lIns="251071" tIns="251071" rIns="251071" bIns="251071" numCol="1" spcCol="1270" anchor="t" anchorCtr="0">
           <a:noAutofit/>
         </a:bodyPr>
         <a:lstStyle/>
@@ -10303,8 +10412,8 @@
         </a:p>
       </dsp:txBody>
       <dsp:txXfrm>
-        <a:off x="3546201" y="1843153"/>
-        <a:ext cx="3423197" cy="1421625"/>
+        <a:off x="2662130" y="1578727"/>
+        <a:ext cx="2541775" cy="1686051"/>
       </dsp:txXfrm>
     </dsp:sp>
     <dsp:sp modelId="{7956D332-D801-4DD7-85FA-8624B0CCDFDE}">
@@ -10314,8 +10423,169 @@
       </dsp:nvSpPr>
       <dsp:spPr>
         <a:xfrm>
-          <a:off x="7077187" y="816194"/>
-          <a:ext cx="3423197" cy="1026959"/>
+          <a:off x="5311694" y="816194"/>
+          <a:ext cx="2541775" cy="762532"/>
+        </a:xfrm>
+        <a:prstGeom prst="rect">
+          <a:avLst/>
+        </a:prstGeom>
+        <a:solidFill>
+          <a:schemeClr val="accent2">
+            <a:hueOff val="-970242"/>
+            <a:satOff val="-55952"/>
+            <a:lumOff val="5752"/>
+            <a:alphaOff val="0"/>
+          </a:schemeClr>
+        </a:solidFill>
+        <a:ln w="12700" cap="flat" cmpd="sng" algn="ctr">
+          <a:solidFill>
+            <a:schemeClr val="accent2">
+              <a:hueOff val="-970242"/>
+              <a:satOff val="-55952"/>
+              <a:lumOff val="5752"/>
+              <a:alphaOff val="0"/>
+            </a:schemeClr>
+          </a:solidFill>
+          <a:prstDash val="solid"/>
+          <a:miter lim="800000"/>
+        </a:ln>
+        <a:effectLst/>
+      </dsp:spPr>
+      <dsp:style>
+        <a:lnRef idx="2">
+          <a:scrgbClr r="0" g="0" b="0"/>
+        </a:lnRef>
+        <a:fillRef idx="1">
+          <a:scrgbClr r="0" g="0" b="0"/>
+        </a:fillRef>
+        <a:effectRef idx="0">
+          <a:scrgbClr r="0" g="0" b="0"/>
+        </a:effectRef>
+        <a:fontRef idx="minor">
+          <a:schemeClr val="lt1"/>
+        </a:fontRef>
+      </dsp:style>
+      <dsp:txBody>
+        <a:bodyPr spcFirstLastPara="0" vert="horz" wrap="square" lIns="200857" tIns="200857" rIns="200857" bIns="200857" numCol="1" spcCol="1270" anchor="ctr" anchorCtr="0">
+          <a:noAutofit/>
+        </a:bodyPr>
+        <a:lstStyle/>
+        <a:p>
+          <a:pPr marL="0" lvl="0" indent="0" algn="ctr" defTabSz="622300">
+            <a:lnSpc>
+              <a:spcPct val="90000"/>
+            </a:lnSpc>
+            <a:spcBef>
+              <a:spcPct val="0"/>
+            </a:spcBef>
+            <a:spcAft>
+              <a:spcPct val="35000"/>
+            </a:spcAft>
+            <a:buNone/>
+          </a:pPr>
+          <a:r>
+            <a:rPr lang="en-US" sz="1400" kern="1200" dirty="0"/>
+            <a:t>Forum for deep learning beginners</a:t>
+          </a:r>
+        </a:p>
+      </dsp:txBody>
+      <dsp:txXfrm>
+        <a:off x="5311694" y="816194"/>
+        <a:ext cx="2541775" cy="762532"/>
+      </dsp:txXfrm>
+    </dsp:sp>
+    <dsp:sp modelId="{6D0FA155-DBBE-4FA7-8D07-9B245A6E2610}">
+      <dsp:nvSpPr>
+        <dsp:cNvPr id="0" name=""/>
+        <dsp:cNvSpPr/>
+      </dsp:nvSpPr>
+      <dsp:spPr>
+        <a:xfrm>
+          <a:off x="5311694" y="1578727"/>
+          <a:ext cx="2541775" cy="1686051"/>
+        </a:xfrm>
+        <a:prstGeom prst="rect">
+          <a:avLst/>
+        </a:prstGeom>
+        <a:solidFill>
+          <a:schemeClr val="accent2">
+            <a:tint val="40000"/>
+            <a:alpha val="90000"/>
+            <a:hueOff val="-566151"/>
+            <a:satOff val="-50231"/>
+            <a:lumOff val="-513"/>
+            <a:alphaOff val="0"/>
+          </a:schemeClr>
+        </a:solidFill>
+        <a:ln w="12700" cap="flat" cmpd="sng" algn="ctr">
+          <a:solidFill>
+            <a:schemeClr val="accent2">
+              <a:tint val="40000"/>
+              <a:alpha val="90000"/>
+              <a:hueOff val="-566151"/>
+              <a:satOff val="-50231"/>
+              <a:lumOff val="-513"/>
+              <a:alphaOff val="0"/>
+            </a:schemeClr>
+          </a:solidFill>
+          <a:prstDash val="solid"/>
+          <a:miter lim="800000"/>
+        </a:ln>
+        <a:effectLst/>
+      </dsp:spPr>
+      <dsp:style>
+        <a:lnRef idx="2">
+          <a:scrgbClr r="0" g="0" b="0"/>
+        </a:lnRef>
+        <a:fillRef idx="1">
+          <a:scrgbClr r="0" g="0" b="0"/>
+        </a:fillRef>
+        <a:effectRef idx="0">
+          <a:scrgbClr r="0" g="0" b="0"/>
+        </a:effectRef>
+        <a:fontRef idx="minor"/>
+      </dsp:style>
+      <dsp:txBody>
+        <a:bodyPr spcFirstLastPara="0" vert="horz" wrap="square" lIns="251071" tIns="251071" rIns="251071" bIns="251071" numCol="1" spcCol="1270" anchor="t" anchorCtr="0">
+          <a:noAutofit/>
+        </a:bodyPr>
+        <a:lstStyle/>
+        <a:p>
+          <a:pPr marL="0" lvl="0" indent="0" algn="l" defTabSz="488950">
+            <a:lnSpc>
+              <a:spcPct val="90000"/>
+            </a:lnSpc>
+            <a:spcBef>
+              <a:spcPct val="0"/>
+            </a:spcBef>
+            <a:spcAft>
+              <a:spcPct val="35000"/>
+            </a:spcAft>
+            <a:buNone/>
+          </a:pPr>
+          <a:r>
+            <a:rPr lang="en-AU" sz="1100" b="1" kern="1200" dirty="0">
+              <a:hlinkClick xmlns:r="http://schemas.openxmlformats.org/officeDocument/2006/relationships" r:id="rId3"/>
+            </a:rPr>
+            <a:t>http://forums.fast.ai/c/part1v2-beg</a:t>
+          </a:r>
+          <a:endParaRPr lang="en-US" sz="1100" kern="1200" dirty="0"/>
+        </a:p>
+      </dsp:txBody>
+      <dsp:txXfrm>
+        <a:off x="5311694" y="1578727"/>
+        <a:ext cx="2541775" cy="1686051"/>
+      </dsp:txXfrm>
+    </dsp:sp>
+    <dsp:sp modelId="{9A5C8D67-814B-44B2-972E-7481F8871FA4}">
+      <dsp:nvSpPr>
+        <dsp:cNvPr id="0" name=""/>
+        <dsp:cNvSpPr/>
+      </dsp:nvSpPr>
+      <dsp:spPr>
+        <a:xfrm>
+          <a:off x="7961258" y="816194"/>
+          <a:ext cx="2541775" cy="762532"/>
         </a:xfrm>
         <a:prstGeom prst="rect">
           <a:avLst/>
@@ -10357,12 +10627,12 @@
         </a:fontRef>
       </dsp:style>
       <dsp:txBody>
-        <a:bodyPr spcFirstLastPara="0" vert="horz" wrap="square" lIns="270509" tIns="270509" rIns="270509" bIns="270509" numCol="1" spcCol="1270" anchor="ctr" anchorCtr="0">
+        <a:bodyPr spcFirstLastPara="0" vert="horz" wrap="square" lIns="200857" tIns="200857" rIns="200857" bIns="200857" numCol="1" spcCol="1270" anchor="ctr" anchorCtr="0">
           <a:noAutofit/>
         </a:bodyPr>
         <a:lstStyle/>
         <a:p>
-          <a:pPr marL="0" lvl="0" indent="0" algn="ctr" defTabSz="755650">
+          <a:pPr marL="0" lvl="0" indent="0" algn="ctr" defTabSz="622300">
             <a:lnSpc>
               <a:spcPct val="90000"/>
             </a:lnSpc>
@@ -10375,25 +10645,25 @@
             <a:buNone/>
           </a:pPr>
           <a:r>
-            <a:rPr lang="en-US" sz="1700" kern="1200" dirty="0"/>
-            <a:t>Forum for deep learning beginners</a:t>
+            <a:rPr lang="en-US" sz="1400" kern="1200" dirty="0"/>
+            <a:t>Annotated notebook</a:t>
           </a:r>
         </a:p>
       </dsp:txBody>
       <dsp:txXfrm>
-        <a:off x="7077187" y="816194"/>
-        <a:ext cx="3423197" cy="1026959"/>
+        <a:off x="7961258" y="816194"/>
+        <a:ext cx="2541775" cy="762532"/>
       </dsp:txXfrm>
     </dsp:sp>
-    <dsp:sp modelId="{6D0FA155-DBBE-4FA7-8D07-9B245A6E2610}">
+    <dsp:sp modelId="{300D7F7E-4831-45C7-884C-88E76A998EA5}">
       <dsp:nvSpPr>
         <dsp:cNvPr id="0" name=""/>
         <dsp:cNvSpPr/>
       </dsp:nvSpPr>
       <dsp:spPr>
         <a:xfrm>
-          <a:off x="7077187" y="1843153"/>
-          <a:ext cx="3423197" cy="1421625"/>
+          <a:off x="7961258" y="1578727"/>
+          <a:ext cx="2541775" cy="1686051"/>
         </a:xfrm>
         <a:prstGeom prst="rect">
           <a:avLst/>
@@ -10437,7 +10707,7 @@
         <a:fontRef idx="minor"/>
       </dsp:style>
       <dsp:txBody>
-        <a:bodyPr spcFirstLastPara="0" vert="horz" wrap="square" lIns="338136" tIns="338136" rIns="338136" bIns="338136" numCol="1" spcCol="1270" anchor="t" anchorCtr="0">
+        <a:bodyPr spcFirstLastPara="0" vert="horz" wrap="square" lIns="251071" tIns="251071" rIns="251071" bIns="251071" numCol="1" spcCol="1270" anchor="t" anchorCtr="0">
           <a:noAutofit/>
         </a:bodyPr>
         <a:lstStyle/>
@@ -10455,17 +10725,32 @@
             <a:buNone/>
           </a:pPr>
           <a:r>
-            <a:rPr lang="en-AU" sz="1100" b="1" kern="1200" dirty="0">
-              <a:hlinkClick xmlns:r="http://schemas.openxmlformats.org/officeDocument/2006/relationships" r:id="rId3"/>
+            <a:rPr lang="en-US" sz="1100" kern="1200">
+              <a:hlinkClick xmlns:r="http://schemas.openxmlformats.org/officeDocument/2006/relationships" r:id="rId4"/>
             </a:rPr>
-            <a:t>http://forums.fast.ai/c/part1v2-beg</a:t>
+            <a:t>http://forums.fast.ai/uploads/default/original/2X/b/b01dffa62debfb8450fb9a3969d650645c54a3aa.pdf</a:t>
           </a:r>
+          <a:endParaRPr lang="en-US" sz="1100" kern="1200"/>
+        </a:p>
+        <a:p>
+          <a:pPr marL="0" lvl="0" indent="0" algn="l" defTabSz="488950">
+            <a:lnSpc>
+              <a:spcPct val="90000"/>
+            </a:lnSpc>
+            <a:spcBef>
+              <a:spcPct val="0"/>
+            </a:spcBef>
+            <a:spcAft>
+              <a:spcPct val="35000"/>
+            </a:spcAft>
+            <a:buNone/>
+          </a:pPr>
           <a:endParaRPr lang="en-US" sz="1100" kern="1200" dirty="0"/>
         </a:p>
       </dsp:txBody>
       <dsp:txXfrm>
-        <a:off x="7077187" y="1843153"/>
-        <a:ext cx="3423197" cy="1421625"/>
+        <a:off x="7961258" y="1578727"/>
+        <a:ext cx="2541775" cy="1686051"/>
       </dsp:txXfrm>
     </dsp:sp>
   </dsp:spTree>
@@ -28875,7 +29160,7 @@
             <p:ph idx="1"/>
             <p:extLst>
               <p:ext uri="{D42A27DB-BD31-4B8C-83A1-F6EECF244321}">
-                <p14:modId xmlns:p14="http://schemas.microsoft.com/office/powerpoint/2010/main" val="1679175214"/>
+                <p14:modId xmlns:p14="http://schemas.microsoft.com/office/powerpoint/2010/main" val="3582313776"/>
               </p:ext>
             </p:extLst>
           </p:nvPr>

</xml_diff>